<commit_message>
report and ppt update
deepcopy report update
</commit_message>
<xml_diff>
--- a/project_presentation.pptx
+++ b/project_presentation.pptx
@@ -134,7 +134,7 @@
 <file path=ppt/revisionInfo.xml><?xml version="1.0" encoding="utf-8"?>
 <p1510:revInfo xmlns:a="http://schemas.openxmlformats.org/drawingml/2006/main" xmlns:r="http://schemas.openxmlformats.org/officeDocument/2006/relationships" xmlns:p1510="http://schemas.microsoft.com/office/powerpoint/2015/10/main">
   <p1510:revLst>
-    <p1510:client id="{FE6F6F7D-017C-4E81-88EE-5540CCD997AD}" v="22" dt="2025-10-26T19:51:03.828"/>
+    <p1510:client id="{FE6F6F7D-017C-4E81-88EE-5540CCD997AD}" v="29" dt="2025-10-26T22:31:04.012"/>
   </p1510:revLst>
 </p1510:revInfo>
 </file>
@@ -143,8 +143,8 @@
 <pc:chgInfo xmlns:a="http://schemas.openxmlformats.org/drawingml/2006/main" xmlns:r="http://schemas.openxmlformats.org/officeDocument/2006/relationships" xmlns:ac="http://schemas.microsoft.com/office/drawing/2013/main/command" xmlns:pc="http://schemas.microsoft.com/office/powerpoint/2013/main/command">
   <pc:docChgLst>
     <pc:chgData name="Dor Knafo" userId="dfde85f9-a1e8-4add-8a5f-b9593dfbdaf6" providerId="ADAL" clId="{D060D16D-AEC5-4FFA-94EF-2E7FFA1D1CAB}"/>
-    <pc:docChg chg="undo custSel addSld delSld modSld sldOrd">
-      <pc:chgData name="Dor Knafo" userId="dfde85f9-a1e8-4add-8a5f-b9593dfbdaf6" providerId="ADAL" clId="{D060D16D-AEC5-4FFA-94EF-2E7FFA1D1CAB}" dt="2025-10-26T19:51:19.168" v="928"/>
+    <pc:docChg chg="undo redo custSel addSld delSld modSld sldOrd">
+      <pc:chgData name="Dor Knafo" userId="dfde85f9-a1e8-4add-8a5f-b9593dfbdaf6" providerId="ADAL" clId="{D060D16D-AEC5-4FFA-94EF-2E7FFA1D1CAB}" dt="2025-10-26T22:31:07.044" v="995" actId="20577"/>
       <pc:docMkLst>
         <pc:docMk/>
       </pc:docMkLst>
@@ -517,17 +517,41 @@
         </pc:picChg>
       </pc:sldChg>
       <pc:sldChg chg="addSp delSp modSp new mod setBg">
-        <pc:chgData name="Dor Knafo" userId="dfde85f9-a1e8-4add-8a5f-b9593dfbdaf6" providerId="ADAL" clId="{D060D16D-AEC5-4FFA-94EF-2E7FFA1D1CAB}" dt="2025-10-26T19:40:32.338" v="809" actId="1076"/>
+        <pc:chgData name="Dor Knafo" userId="dfde85f9-a1e8-4add-8a5f-b9593dfbdaf6" providerId="ADAL" clId="{D060D16D-AEC5-4FFA-94EF-2E7FFA1D1CAB}" dt="2025-10-26T22:30:09.932" v="971" actId="1076"/>
         <pc:sldMkLst>
           <pc:docMk/>
           <pc:sldMk cId="3164854576" sldId="272"/>
         </pc:sldMkLst>
-        <pc:picChg chg="add mod">
-          <ac:chgData name="Dor Knafo" userId="dfde85f9-a1e8-4add-8a5f-b9593dfbdaf6" providerId="ADAL" clId="{D060D16D-AEC5-4FFA-94EF-2E7FFA1D1CAB}" dt="2025-10-26T19:40:32.338" v="809" actId="1076"/>
+        <pc:spChg chg="add del">
+          <ac:chgData name="Dor Knafo" userId="dfde85f9-a1e8-4add-8a5f-b9593dfbdaf6" providerId="ADAL" clId="{D060D16D-AEC5-4FFA-94EF-2E7FFA1D1CAB}" dt="2025-10-26T22:27:38.931" v="947" actId="26606"/>
+          <ac:spMkLst>
+            <pc:docMk/>
+            <pc:sldMk cId="3164854576" sldId="272"/>
+            <ac:spMk id="11" creationId="{799448F2-0E5B-42DA-B2D1-11A14E947BD4}"/>
+          </ac:spMkLst>
+        </pc:spChg>
+        <pc:spChg chg="add del">
+          <ac:chgData name="Dor Knafo" userId="dfde85f9-a1e8-4add-8a5f-b9593dfbdaf6" providerId="ADAL" clId="{D060D16D-AEC5-4FFA-94EF-2E7FFA1D1CAB}" dt="2025-10-26T22:27:38.931" v="947" actId="26606"/>
+          <ac:spMkLst>
+            <pc:docMk/>
+            <pc:sldMk cId="3164854576" sldId="272"/>
+            <ac:spMk id="13" creationId="{4E8A7552-20E1-4F34-ADAB-C1DB6634D47E}"/>
+          </ac:spMkLst>
+        </pc:spChg>
+        <pc:picChg chg="add mod ord">
+          <ac:chgData name="Dor Knafo" userId="dfde85f9-a1e8-4add-8a5f-b9593dfbdaf6" providerId="ADAL" clId="{D060D16D-AEC5-4FFA-94EF-2E7FFA1D1CAB}" dt="2025-10-26T22:27:49.135" v="956" actId="14100"/>
           <ac:picMkLst>
             <pc:docMk/>
             <pc:sldMk cId="3164854576" sldId="272"/>
             <ac:picMk id="3" creationId="{45DE95A5-CBE3-60E0-FE8E-AE0860F0C3B2}"/>
+          </ac:picMkLst>
+        </pc:picChg>
+        <pc:picChg chg="add mod ord">
+          <ac:chgData name="Dor Knafo" userId="dfde85f9-a1e8-4add-8a5f-b9593dfbdaf6" providerId="ADAL" clId="{D060D16D-AEC5-4FFA-94EF-2E7FFA1D1CAB}" dt="2025-10-26T22:30:09.932" v="971" actId="1076"/>
+          <ac:picMkLst>
+            <pc:docMk/>
+            <pc:sldMk cId="3164854576" sldId="272"/>
+            <ac:picMk id="4" creationId="{D5F46E94-E501-DD77-0026-A8BE9B0716EB}"/>
           </ac:picMkLst>
         </pc:picChg>
         <pc:picChg chg="add del mod">
@@ -538,9 +562,33 @@
             <ac:picMk id="5" creationId="{8D93DC9B-7386-5B3D-6710-A454B8DE18CC}"/>
           </ac:picMkLst>
         </pc:picChg>
+        <pc:picChg chg="add mod">
+          <ac:chgData name="Dor Knafo" userId="dfde85f9-a1e8-4add-8a5f-b9593dfbdaf6" providerId="ADAL" clId="{D060D16D-AEC5-4FFA-94EF-2E7FFA1D1CAB}" dt="2025-10-26T22:28:02.262" v="960" actId="1076"/>
+          <ac:picMkLst>
+            <pc:docMk/>
+            <pc:sldMk cId="3164854576" sldId="272"/>
+            <ac:picMk id="6" creationId="{25E3463C-9972-A026-2942-21968C7A1600}"/>
+          </ac:picMkLst>
+        </pc:picChg>
+        <pc:cxnChg chg="add del">
+          <ac:chgData name="Dor Knafo" userId="dfde85f9-a1e8-4add-8a5f-b9593dfbdaf6" providerId="ADAL" clId="{D060D16D-AEC5-4FFA-94EF-2E7FFA1D1CAB}" dt="2025-10-26T22:27:45.131" v="949" actId="26606"/>
+          <ac:cxnSpMkLst>
+            <pc:docMk/>
+            <pc:sldMk cId="3164854576" sldId="272"/>
+            <ac:cxnSpMk id="15" creationId="{DCD67800-37AC-4E14-89B0-F79DCB3FB86D}"/>
+          </ac:cxnSpMkLst>
+        </pc:cxnChg>
+        <pc:cxnChg chg="add del">
+          <ac:chgData name="Dor Knafo" userId="dfde85f9-a1e8-4add-8a5f-b9593dfbdaf6" providerId="ADAL" clId="{D060D16D-AEC5-4FFA-94EF-2E7FFA1D1CAB}" dt="2025-10-26T22:27:45.131" v="949" actId="26606"/>
+          <ac:cxnSpMkLst>
+            <pc:docMk/>
+            <pc:sldMk cId="3164854576" sldId="272"/>
+            <ac:cxnSpMk id="16" creationId="{20F1788F-A5AE-4188-8274-F7F2E3833ECD}"/>
+          </ac:cxnSpMkLst>
+        </pc:cxnChg>
       </pc:sldChg>
       <pc:sldChg chg="addSp modSp new mod">
-        <pc:chgData name="Dor Knafo" userId="dfde85f9-a1e8-4add-8a5f-b9593dfbdaf6" providerId="ADAL" clId="{D060D16D-AEC5-4FFA-94EF-2E7FFA1D1CAB}" dt="2025-10-26T19:51:19.168" v="928"/>
+        <pc:chgData name="Dor Knafo" userId="dfde85f9-a1e8-4add-8a5f-b9593dfbdaf6" providerId="ADAL" clId="{D060D16D-AEC5-4FFA-94EF-2E7FFA1D1CAB}" dt="2025-10-26T22:31:07.044" v="995" actId="20577"/>
         <pc:sldMkLst>
           <pc:docMk/>
           <pc:sldMk cId="3468369045" sldId="273"/>
@@ -554,7 +602,7 @@
           </ac:spMkLst>
         </pc:spChg>
         <pc:spChg chg="mod">
-          <ac:chgData name="Dor Knafo" userId="dfde85f9-a1e8-4add-8a5f-b9593dfbdaf6" providerId="ADAL" clId="{D060D16D-AEC5-4FFA-94EF-2E7FFA1D1CAB}" dt="2025-10-26T19:51:19.168" v="928"/>
+          <ac:chgData name="Dor Knafo" userId="dfde85f9-a1e8-4add-8a5f-b9593dfbdaf6" providerId="ADAL" clId="{D060D16D-AEC5-4FFA-94EF-2E7FFA1D1CAB}" dt="2025-10-26T22:31:07.044" v="995" actId="20577"/>
           <ac:spMkLst>
             <pc:docMk/>
             <pc:sldMk cId="3468369045" sldId="273"/>
@@ -4622,7 +4670,7 @@
       </p:grpSpPr>
       <p:pic>
         <p:nvPicPr>
-          <p:cNvPr id="3" name="Picture 2">
+          <p:cNvPr id="3" name="Picture 2" descr="A computer screen with numbers and text&#10;&#10;AI-generated content may be incorrect.">
             <a:extLst>
               <a:ext uri="{FF2B5EF4-FFF2-40B4-BE49-F238E27FC236}">
                 <a16:creationId xmlns:a16="http://schemas.microsoft.com/office/drawing/2014/main" id="{45DE95A5-CBE3-60E0-FE8E-AE0860F0C3B2}"/>
@@ -4642,8 +4690,68 @@
         </p:blipFill>
         <p:spPr>
           <a:xfrm>
-            <a:off x="406021" y="1817358"/>
-            <a:ext cx="11379958" cy="2882090"/>
+            <a:off x="897340" y="431905"/>
+            <a:ext cx="6936475" cy="1756733"/>
+          </a:xfrm>
+          <a:prstGeom prst="rect">
+            <a:avLst/>
+          </a:prstGeom>
+        </p:spPr>
+      </p:pic>
+      <p:pic>
+        <p:nvPicPr>
+          <p:cNvPr id="4" name="Picture 3" descr="A screenshot of a computer&#10;&#10;AI-generated content may be incorrect.">
+            <a:extLst>
+              <a:ext uri="{FF2B5EF4-FFF2-40B4-BE49-F238E27FC236}">
+                <a16:creationId xmlns:a16="http://schemas.microsoft.com/office/drawing/2014/main" id="{D5F46E94-E501-DD77-0026-A8BE9B0716EB}"/>
+              </a:ext>
+            </a:extLst>
+          </p:cNvPr>
+          <p:cNvPicPr>
+            <a:picLocks noChangeAspect="1"/>
+          </p:cNvPicPr>
+          <p:nvPr/>
+        </p:nvPicPr>
+        <p:blipFill>
+          <a:blip r:embed="rId3"/>
+          <a:stretch>
+            <a:fillRect/>
+          </a:stretch>
+        </p:blipFill>
+        <p:spPr>
+          <a:xfrm>
+            <a:off x="897340" y="2474309"/>
+            <a:ext cx="7700750" cy="1628457"/>
+          </a:xfrm>
+          <a:prstGeom prst="rect">
+            <a:avLst/>
+          </a:prstGeom>
+        </p:spPr>
+      </p:pic>
+      <p:pic>
+        <p:nvPicPr>
+          <p:cNvPr id="6" name="Picture 5" descr="A computer screen with numbers and symbols&#10;&#10;AI-generated content may be incorrect.">
+            <a:extLst>
+              <a:ext uri="{FF2B5EF4-FFF2-40B4-BE49-F238E27FC236}">
+                <a16:creationId xmlns:a16="http://schemas.microsoft.com/office/drawing/2014/main" id="{25E3463C-9972-A026-2942-21968C7A1600}"/>
+              </a:ext>
+            </a:extLst>
+          </p:cNvPr>
+          <p:cNvPicPr>
+            <a:picLocks noChangeAspect="1"/>
+          </p:cNvPicPr>
+          <p:nvPr/>
+        </p:nvPicPr>
+        <p:blipFill>
+          <a:blip r:embed="rId4"/>
+          <a:stretch>
+            <a:fillRect/>
+          </a:stretch>
+        </p:blipFill>
+        <p:spPr>
+          <a:xfrm>
+            <a:off x="897340" y="4340669"/>
+            <a:ext cx="7841776" cy="2016308"/>
           </a:xfrm>
           <a:prstGeom prst="rect">
             <a:avLst/>
@@ -4755,26 +4863,19 @@
           </a:p>
           <a:p>
             <a:r>
+              <a:rPr lang="en-US" dirty="0"/>
+              <a:t>The performance gain mainly results from reduced interpreter loops.</a:t>
+            </a:r>
+          </a:p>
+          <a:p>
+            <a:r>
               <a:rPr lang="en-US" b="1" dirty="0"/>
-              <a:t>Cache-miss rate improved by ~11%</a:t>
-            </a:r>
-            <a:r>
-              <a:rPr lang="en-US" dirty="0"/>
-              <a:t>, showing better data locality at the C level.</a:t>
-            </a:r>
-          </a:p>
-          <a:p>
-            <a:r>
-              <a:rPr lang="en-US" dirty="0"/>
-              <a:t>Branch-miss rate remained nearly unchanged.</a:t>
-            </a:r>
-          </a:p>
-          <a:p>
-            <a:r>
-              <a:rPr lang="en-US"/>
-              <a:t>The performance gain mainly results from reduced interpreter loops and more predictable, cache-friendly C-level code paths.</a:t>
-            </a:r>
-            <a:endParaRPr lang="en-US" dirty="0"/>
+              <a:t>Cache-miss and branch-miss rates</a:t>
+            </a:r>
+            <a:r>
+              <a:rPr lang="en-US" dirty="0"/>
+              <a:t> fluctuated between runs, likely due to fewer memory accesses overall, making the relative ratios more sensitive to small variations and system noise.</a:t>
+            </a:r>
           </a:p>
         </p:txBody>
       </p:sp>

</xml_diff>